<commit_message>
Clases software por partes
Diapositivas por partes
</commit_message>
<xml_diff>
--- a/Clases software/Unidad5.pptx
+++ b/Clases software/Unidad5.pptx
@@ -218,7 +218,7 @@
           <a:p>
             <a:fld id="{7FF7D7FF-DDC7-474C-8526-899954A31AD1}" type="datetimeFigureOut">
               <a:rPr lang="es-EC" smtClean="0"/>
-              <a:t>17/12/2023</a:t>
+              <a:t>10/1/2024</a:t>
             </a:fld>
             <a:endParaRPr lang="es-EC"/>
           </a:p>
@@ -644,7 +644,7 @@
           <a:p>
             <a:fld id="{8FEB83C7-CE7D-EE43-931B-A983B2AE7CF3}" type="datetimeFigureOut">
               <a:rPr lang="es-EC" smtClean="0"/>
-              <a:t>17/12/2023</a:t>
+              <a:t>10/1/2024</a:t>
             </a:fld>
             <a:endParaRPr lang="es-EC"/>
           </a:p>
@@ -1121,8 +1121,8 @@
         </p:nvSpPr>
         <p:spPr>
           <a:xfrm>
-            <a:off x="8770775" y="4725182"/>
-            <a:ext cx="1236236" cy="369332"/>
+            <a:off x="8789437" y="4725182"/>
+            <a:ext cx="1031051" cy="369332"/>
           </a:xfrm>
           <a:prstGeom prst="rect">
             <a:avLst/>
@@ -1137,7 +1137,7 @@
           <a:p>
             <a:r>
               <a:rPr lang="es-419" dirty="0"/>
-              <a:t>Unidades 5</a:t>
+              <a:t>Unidad 5</a:t>
             </a:r>
           </a:p>
         </p:txBody>

</xml_diff>